<commit_message>
another fun page added
</commit_message>
<xml_diff>
--- a/test/Australia Int’l Trading report.pptx
+++ b/test/Australia Int’l Trading report.pptx
@@ -13308,7 +13308,7 @@
         <p:spPr>
           <a:xfrm>
             <a:off x="6347361" y="3882887"/>
-            <a:ext cx="914400" cy="1200329"/>
+            <a:ext cx="914400" cy="923330"/>
           </a:xfrm>
           <a:prstGeom prst="rect">
             <a:avLst/>
@@ -13321,28 +13321,13 @@
           </a:bodyPr>
           <a:lstStyle/>
           <a:p>
-            <a:r>
-              <a:rPr lang="en-AU" dirty="0">
-                <a:solidFill>
-                  <a:schemeClr val="accent1">
-                    <a:lumMod val="50000"/>
-                  </a:schemeClr>
-                </a:solidFill>
-              </a:rPr>
-              <a:t>TONY</a:t>
-            </a:r>
-          </a:p>
-          <a:p>
-            <a:r>
-              <a:rPr lang="en-AU" dirty="0">
-                <a:solidFill>
-                  <a:schemeClr val="accent1">
-                    <a:lumMod val="50000"/>
-                  </a:schemeClr>
-                </a:solidFill>
-              </a:rPr>
-              <a:t>ZHAO</a:t>
-            </a:r>
+            <a:endParaRPr lang="en-AU" dirty="0">
+              <a:solidFill>
+                <a:schemeClr val="accent1">
+                  <a:lumMod val="50000"/>
+                </a:schemeClr>
+              </a:solidFill>
+            </a:endParaRPr>
           </a:p>
           <a:p>
             <a:r>

</xml_diff>